<commit_message>
add blockwise training figures
</commit_message>
<xml_diff>
--- a/latex/figures/guided_inpainting.pptx
+++ b/latex/figures/guided_inpainting.pptx
@@ -14,6 +14,12 @@
     <p:sldId id="278" r:id="rId8"/>
     <p:sldId id="279" r:id="rId9"/>
     <p:sldId id="280" r:id="rId10"/>
+    <p:sldId id="281" r:id="rId11"/>
+    <p:sldId id="282" r:id="rId12"/>
+    <p:sldId id="286" r:id="rId13"/>
+    <p:sldId id="283" r:id="rId14"/>
+    <p:sldId id="284" r:id="rId15"/>
+    <p:sldId id="285" r:id="rId16"/>
   </p:sldIdLst>
   <p:sldSz cx="12192000" cy="6858000"/>
   <p:notesSz cx="6858000" cy="9144000"/>
@@ -3019,6 +3025,2073 @@
     <p:extLst>
       <p:ext uri="{BB962C8B-B14F-4D97-AF65-F5344CB8AC3E}">
         <p14:creationId xmlns:p14="http://schemas.microsoft.com/office/powerpoint/2010/main" val="1102520059"/>
+      </p:ext>
+    </p:extLst>
+  </p:cSld>
+  <p:clrMapOvr>
+    <a:masterClrMapping/>
+  </p:clrMapOvr>
+</p:sld>
+</file>
+
+<file path=ppt/slides/slide10.xml><?xml version="1.0" encoding="utf-8"?>
+<p:sld xmlns:a="http://schemas.openxmlformats.org/drawingml/2006/main" xmlns:r="http://schemas.openxmlformats.org/officeDocument/2006/relationships" xmlns:p="http://schemas.openxmlformats.org/presentationml/2006/main">
+  <p:cSld>
+    <p:spTree>
+      <p:nvGrpSpPr>
+        <p:cNvPr id="1" name=""/>
+        <p:cNvGrpSpPr/>
+        <p:nvPr/>
+      </p:nvGrpSpPr>
+      <p:grpSpPr>
+        <a:xfrm>
+          <a:off x="0" y="0"/>
+          <a:ext cx="0" cy="0"/>
+          <a:chOff x="0" y="0"/>
+          <a:chExt cx="0" cy="0"/>
+        </a:xfrm>
+      </p:grpSpPr>
+      <p:sp>
+        <p:nvSpPr>
+          <p:cNvPr id="2" name="标题 1"/>
+          <p:cNvSpPr>
+            <a:spLocks noGrp="1"/>
+          </p:cNvSpPr>
+          <p:nvPr>
+            <p:ph type="title"/>
+          </p:nvPr>
+        </p:nvSpPr>
+        <p:spPr/>
+        <p:txBody>
+          <a:bodyPr/>
+          <a:lstStyle/>
+          <a:p>
+            <a:endParaRPr kumimoji="1" lang="zh-CN" altLang="en-US"/>
+          </a:p>
+        </p:txBody>
+      </p:sp>
+      <p:sp>
+        <p:nvSpPr>
+          <p:cNvPr id="3" name="内容占位符 2"/>
+          <p:cNvSpPr>
+            <a:spLocks noGrp="1"/>
+          </p:cNvSpPr>
+          <p:nvPr>
+            <p:ph idx="1"/>
+          </p:nvPr>
+        </p:nvSpPr>
+        <p:spPr/>
+        <p:txBody>
+          <a:bodyPr/>
+          <a:lstStyle/>
+          <a:p>
+            <a:endParaRPr kumimoji="1" lang="zh-CN" altLang="en-US"/>
+          </a:p>
+        </p:txBody>
+      </p:sp>
+    </p:spTree>
+    <p:extLst>
+      <p:ext uri="{BB962C8B-B14F-4D97-AF65-F5344CB8AC3E}">
+        <p14:creationId xmlns:p14="http://schemas.microsoft.com/office/powerpoint/2010/main" val="159473059"/>
+      </p:ext>
+    </p:extLst>
+  </p:cSld>
+  <p:clrMapOvr>
+    <a:masterClrMapping/>
+  </p:clrMapOvr>
+</p:sld>
+</file>
+
+<file path=ppt/slides/slide11.xml><?xml version="1.0" encoding="utf-8"?>
+<p:sld xmlns:a="http://schemas.openxmlformats.org/drawingml/2006/main" xmlns:r="http://schemas.openxmlformats.org/officeDocument/2006/relationships" xmlns:p="http://schemas.openxmlformats.org/presentationml/2006/main">
+  <p:cSld>
+    <p:spTree>
+      <p:nvGrpSpPr>
+        <p:cNvPr id="1" name=""/>
+        <p:cNvGrpSpPr/>
+        <p:nvPr/>
+      </p:nvGrpSpPr>
+      <p:grpSpPr>
+        <a:xfrm>
+          <a:off x="0" y="0"/>
+          <a:ext cx="0" cy="0"/>
+          <a:chOff x="0" y="0"/>
+          <a:chExt cx="0" cy="0"/>
+        </a:xfrm>
+      </p:grpSpPr>
+      <p:grpSp>
+        <p:nvGrpSpPr>
+          <p:cNvPr id="11" name="组 10"/>
+          <p:cNvGrpSpPr/>
+          <p:nvPr/>
+        </p:nvGrpSpPr>
+        <p:grpSpPr>
+          <a:xfrm>
+            <a:off x="521851" y="2421409"/>
+            <a:ext cx="11428849" cy="1091971"/>
+            <a:chOff x="521851" y="2421409"/>
+            <a:chExt cx="11428849" cy="1091971"/>
+          </a:xfrm>
+        </p:grpSpPr>
+        <p:grpSp>
+          <p:nvGrpSpPr>
+            <p:cNvPr id="8" name="组 7"/>
+            <p:cNvGrpSpPr/>
+            <p:nvPr/>
+          </p:nvGrpSpPr>
+          <p:grpSpPr>
+            <a:xfrm>
+              <a:off x="2991323" y="2659441"/>
+              <a:ext cx="2798576" cy="853939"/>
+              <a:chOff x="3665693" y="2659441"/>
+              <a:chExt cx="2798576" cy="853939"/>
+            </a:xfrm>
+          </p:grpSpPr>
+          <p:sp>
+            <p:nvSpPr>
+              <p:cNvPr id="4" name="Cube 48"/>
+              <p:cNvSpPr/>
+              <p:nvPr/>
+            </p:nvSpPr>
+            <p:spPr>
+              <a:xfrm>
+                <a:off x="3665693" y="2659441"/>
+                <a:ext cx="733796" cy="853939"/>
+              </a:xfrm>
+              <a:prstGeom prst="cube">
+                <a:avLst>
+                  <a:gd name="adj" fmla="val 36691"/>
+                </a:avLst>
+              </a:prstGeom>
+              <a:solidFill>
+                <a:srgbClr val="FFC000"/>
+              </a:solidFill>
+              <a:ln w="0">
+                <a:solidFill>
+                  <a:schemeClr val="tx1"/>
+                </a:solidFill>
+              </a:ln>
+            </p:spPr>
+            <p:style>
+              <a:lnRef idx="2">
+                <a:schemeClr val="accent1">
+                  <a:shade val="50000"/>
+                </a:schemeClr>
+              </a:lnRef>
+              <a:fillRef idx="1">
+                <a:schemeClr val="accent1"/>
+              </a:fillRef>
+              <a:effectRef idx="0">
+                <a:schemeClr val="accent1"/>
+              </a:effectRef>
+              <a:fontRef idx="minor">
+                <a:schemeClr val="lt1"/>
+              </a:fontRef>
+            </p:style>
+            <p:txBody>
+              <a:bodyPr rtlCol="0" anchor="ctr"/>
+              <a:lstStyle/>
+              <a:p>
+                <a:pPr algn="ctr"/>
+                <a:endParaRPr lang="en-US" sz="2000">
+                  <a:latin typeface="Times New Roman" panose="02020603050405020304" pitchFamily="18" charset="0"/>
+                  <a:cs typeface="Times New Roman" panose="02020603050405020304" pitchFamily="18" charset="0"/>
+                </a:endParaRPr>
+              </a:p>
+            </p:txBody>
+          </p:sp>
+          <p:sp>
+            <p:nvSpPr>
+              <p:cNvPr id="5" name="Cube 48"/>
+              <p:cNvSpPr/>
+              <p:nvPr/>
+            </p:nvSpPr>
+            <p:spPr>
+              <a:xfrm>
+                <a:off x="4313488" y="2659441"/>
+                <a:ext cx="666422" cy="853939"/>
+              </a:xfrm>
+              <a:prstGeom prst="cube">
+                <a:avLst>
+                  <a:gd name="adj" fmla="val 36691"/>
+                </a:avLst>
+              </a:prstGeom>
+              <a:solidFill>
+                <a:srgbClr val="FFC000"/>
+              </a:solidFill>
+              <a:ln w="0">
+                <a:solidFill>
+                  <a:schemeClr val="tx1"/>
+                </a:solidFill>
+              </a:ln>
+            </p:spPr>
+            <p:style>
+              <a:lnRef idx="2">
+                <a:schemeClr val="accent1">
+                  <a:shade val="50000"/>
+                </a:schemeClr>
+              </a:lnRef>
+              <a:fillRef idx="1">
+                <a:schemeClr val="accent1"/>
+              </a:fillRef>
+              <a:effectRef idx="0">
+                <a:schemeClr val="accent1"/>
+              </a:effectRef>
+              <a:fontRef idx="minor">
+                <a:schemeClr val="lt1"/>
+              </a:fontRef>
+            </p:style>
+            <p:txBody>
+              <a:bodyPr rtlCol="0" anchor="ctr"/>
+              <a:lstStyle/>
+              <a:p>
+                <a:pPr algn="ctr"/>
+                <a:endParaRPr lang="en-US" sz="2000">
+                  <a:latin typeface="Times New Roman" panose="02020603050405020304" pitchFamily="18" charset="0"/>
+                  <a:cs typeface="Times New Roman" panose="02020603050405020304" pitchFamily="18" charset="0"/>
+                </a:endParaRPr>
+              </a:p>
+            </p:txBody>
+          </p:sp>
+          <p:sp>
+            <p:nvSpPr>
+              <p:cNvPr id="6" name="文本框 5"/>
+              <p:cNvSpPr txBox="1"/>
+              <p:nvPr/>
+            </p:nvSpPr>
+            <p:spPr>
+              <a:xfrm>
+                <a:off x="5048446" y="3000991"/>
+                <a:ext cx="1279581" cy="307777"/>
+              </a:xfrm>
+              <a:prstGeom prst="rect">
+                <a:avLst/>
+              </a:prstGeom>
+              <a:noFill/>
+            </p:spPr>
+            <p:txBody>
+              <a:bodyPr wrap="square" rtlCol="0">
+                <a:spAutoFit/>
+              </a:bodyPr>
+              <a:lstStyle/>
+              <a:p>
+                <a:r>
+                  <a:rPr kumimoji="1" lang="zh-CN" altLang="en-US" sz="1400" dirty="0" smtClean="0"/>
+                  <a:t>●●●</a:t>
+                </a:r>
+                <a:endParaRPr kumimoji="1" lang="zh-CN" altLang="en-US" sz="1400" dirty="0"/>
+              </a:p>
+            </p:txBody>
+          </p:sp>
+          <p:sp>
+            <p:nvSpPr>
+              <p:cNvPr id="7" name="Cube 48"/>
+              <p:cNvSpPr/>
+              <p:nvPr/>
+            </p:nvSpPr>
+            <p:spPr>
+              <a:xfrm>
+                <a:off x="5797847" y="2659441"/>
+                <a:ext cx="666422" cy="853939"/>
+              </a:xfrm>
+              <a:prstGeom prst="cube">
+                <a:avLst>
+                  <a:gd name="adj" fmla="val 36691"/>
+                </a:avLst>
+              </a:prstGeom>
+              <a:solidFill>
+                <a:srgbClr val="FFC000"/>
+              </a:solidFill>
+              <a:ln w="0">
+                <a:solidFill>
+                  <a:schemeClr val="tx1"/>
+                </a:solidFill>
+              </a:ln>
+            </p:spPr>
+            <p:style>
+              <a:lnRef idx="2">
+                <a:schemeClr val="accent1">
+                  <a:shade val="50000"/>
+                </a:schemeClr>
+              </a:lnRef>
+              <a:fillRef idx="1">
+                <a:schemeClr val="accent1"/>
+              </a:fillRef>
+              <a:effectRef idx="0">
+                <a:schemeClr val="accent1"/>
+              </a:effectRef>
+              <a:fontRef idx="minor">
+                <a:schemeClr val="lt1"/>
+              </a:fontRef>
+            </p:style>
+            <p:txBody>
+              <a:bodyPr rtlCol="0" anchor="ctr"/>
+              <a:lstStyle/>
+              <a:p>
+                <a:pPr algn="ctr"/>
+                <a:endParaRPr lang="en-US" sz="2000">
+                  <a:latin typeface="Times New Roman" panose="02020603050405020304" pitchFamily="18" charset="0"/>
+                  <a:cs typeface="Times New Roman" panose="02020603050405020304" pitchFamily="18" charset="0"/>
+                </a:endParaRPr>
+              </a:p>
+            </p:txBody>
+          </p:sp>
+        </p:grpSp>
+        <p:cxnSp>
+          <p:nvCxnSpPr>
+            <p:cNvPr id="10" name="直线箭头连接符 9"/>
+            <p:cNvCxnSpPr/>
+            <p:nvPr/>
+          </p:nvCxnSpPr>
+          <p:spPr>
+            <a:xfrm>
+              <a:off x="2400300" y="3177540"/>
+              <a:ext cx="537210" cy="0"/>
+            </a:xfrm>
+            <a:prstGeom prst="straightConnector1">
+              <a:avLst/>
+            </a:prstGeom>
+            <a:ln w="38100">
+              <a:prstDash val="solid"/>
+              <a:tailEnd type="triangle"/>
+            </a:ln>
+          </p:spPr>
+          <p:style>
+            <a:lnRef idx="1">
+              <a:schemeClr val="accent1"/>
+            </a:lnRef>
+            <a:fillRef idx="0">
+              <a:schemeClr val="accent1"/>
+            </a:fillRef>
+            <a:effectRef idx="0">
+              <a:schemeClr val="accent1"/>
+            </a:effectRef>
+            <a:fontRef idx="minor">
+              <a:schemeClr val="tx1"/>
+            </a:fontRef>
+          </p:style>
+        </p:cxnSp>
+        <p:sp>
+          <p:nvSpPr>
+            <p:cNvPr id="12" name="文本框 11"/>
+            <p:cNvSpPr txBox="1"/>
+            <p:nvPr/>
+          </p:nvSpPr>
+          <p:spPr>
+            <a:xfrm>
+              <a:off x="521851" y="2936746"/>
+              <a:ext cx="2099783" cy="461665"/>
+            </a:xfrm>
+            <a:prstGeom prst="rect">
+              <a:avLst/>
+            </a:prstGeom>
+            <a:noFill/>
+          </p:spPr>
+          <p:txBody>
+            <a:bodyPr wrap="square" rtlCol="0">
+              <a:spAutoFit/>
+            </a:bodyPr>
+            <a:lstStyle/>
+            <a:p>
+              <a:r>
+                <a:rPr kumimoji="1" lang="en-US" altLang="zh-CN" sz="2400" dirty="0" err="1" smtClean="0"/>
+                <a:t>Downsample</a:t>
+              </a:r>
+              <a:endParaRPr kumimoji="1" lang="zh-CN" altLang="en-US" sz="2400" dirty="0"/>
+            </a:p>
+          </p:txBody>
+        </p:sp>
+        <p:grpSp>
+          <p:nvGrpSpPr>
+            <p:cNvPr id="9" name="组 8"/>
+            <p:cNvGrpSpPr/>
+            <p:nvPr/>
+          </p:nvGrpSpPr>
+          <p:grpSpPr>
+            <a:xfrm>
+              <a:off x="5875020" y="2421409"/>
+              <a:ext cx="4447869" cy="1091970"/>
+              <a:chOff x="5875020" y="2421409"/>
+              <a:chExt cx="4447869" cy="1091970"/>
+            </a:xfrm>
+          </p:grpSpPr>
+          <p:sp>
+            <p:nvSpPr>
+              <p:cNvPr id="31" name="Cube 48"/>
+              <p:cNvSpPr/>
+              <p:nvPr/>
+            </p:nvSpPr>
+            <p:spPr>
+              <a:xfrm>
+                <a:off x="9055840" y="2659440"/>
+                <a:ext cx="666422" cy="853939"/>
+              </a:xfrm>
+              <a:prstGeom prst="cube">
+                <a:avLst>
+                  <a:gd name="adj" fmla="val 36691"/>
+                </a:avLst>
+              </a:prstGeom>
+              <a:solidFill>
+                <a:srgbClr val="B3E2CD"/>
+              </a:solidFill>
+              <a:ln w="0">
+                <a:solidFill>
+                  <a:schemeClr val="tx1"/>
+                </a:solidFill>
+              </a:ln>
+            </p:spPr>
+            <p:style>
+              <a:lnRef idx="2">
+                <a:schemeClr val="accent1">
+                  <a:shade val="50000"/>
+                </a:schemeClr>
+              </a:lnRef>
+              <a:fillRef idx="1">
+                <a:schemeClr val="accent1"/>
+              </a:fillRef>
+              <a:effectRef idx="0">
+                <a:schemeClr val="accent1"/>
+              </a:effectRef>
+              <a:fontRef idx="minor">
+                <a:schemeClr val="lt1"/>
+              </a:fontRef>
+            </p:style>
+            <p:txBody>
+              <a:bodyPr rtlCol="0" anchor="ctr"/>
+              <a:lstStyle/>
+              <a:p>
+                <a:pPr algn="ctr"/>
+                <a:endParaRPr lang="en-US" sz="2000">
+                  <a:latin typeface="Times New Roman" panose="02020603050405020304" pitchFamily="18" charset="0"/>
+                  <a:cs typeface="Times New Roman" panose="02020603050405020304" pitchFamily="18" charset="0"/>
+                </a:endParaRPr>
+              </a:p>
+            </p:txBody>
+          </p:sp>
+          <p:sp>
+            <p:nvSpPr>
+              <p:cNvPr id="14" name="Cube 48"/>
+              <p:cNvSpPr/>
+              <p:nvPr/>
+            </p:nvSpPr>
+            <p:spPr>
+              <a:xfrm>
+                <a:off x="6471594" y="2659440"/>
+                <a:ext cx="666422" cy="853939"/>
+              </a:xfrm>
+              <a:prstGeom prst="cube">
+                <a:avLst>
+                  <a:gd name="adj" fmla="val 36691"/>
+                </a:avLst>
+              </a:prstGeom>
+              <a:solidFill>
+                <a:srgbClr val="B3E2CD"/>
+              </a:solidFill>
+              <a:ln w="0">
+                <a:solidFill>
+                  <a:schemeClr val="tx1"/>
+                </a:solidFill>
+              </a:ln>
+            </p:spPr>
+            <p:style>
+              <a:lnRef idx="2">
+                <a:schemeClr val="accent1">
+                  <a:shade val="50000"/>
+                </a:schemeClr>
+              </a:lnRef>
+              <a:fillRef idx="1">
+                <a:schemeClr val="accent1"/>
+              </a:fillRef>
+              <a:effectRef idx="0">
+                <a:schemeClr val="accent1"/>
+              </a:effectRef>
+              <a:fontRef idx="minor">
+                <a:schemeClr val="lt1"/>
+              </a:fontRef>
+            </p:style>
+            <p:txBody>
+              <a:bodyPr rtlCol="0" anchor="ctr"/>
+              <a:lstStyle/>
+              <a:p>
+                <a:pPr algn="ctr"/>
+                <a:endParaRPr lang="en-US" sz="2000">
+                  <a:latin typeface="Times New Roman" panose="02020603050405020304" pitchFamily="18" charset="0"/>
+                  <a:cs typeface="Times New Roman" panose="02020603050405020304" pitchFamily="18" charset="0"/>
+                </a:endParaRPr>
+              </a:p>
+            </p:txBody>
+          </p:sp>
+          <p:cxnSp>
+            <p:nvCxnSpPr>
+              <p:cNvPr id="15" name="直线箭头连接符 14"/>
+              <p:cNvCxnSpPr/>
+              <p:nvPr/>
+            </p:nvCxnSpPr>
+            <p:spPr>
+              <a:xfrm>
+                <a:off x="5875020" y="3067358"/>
+                <a:ext cx="596574" cy="0"/>
+              </a:xfrm>
+              <a:prstGeom prst="straightConnector1">
+                <a:avLst/>
+              </a:prstGeom>
+              <a:ln w="38100">
+                <a:prstDash val="solid"/>
+                <a:tailEnd type="triangle"/>
+              </a:ln>
+            </p:spPr>
+            <p:style>
+              <a:lnRef idx="1">
+                <a:schemeClr val="accent1"/>
+              </a:lnRef>
+              <a:fillRef idx="0">
+                <a:schemeClr val="accent1"/>
+              </a:fillRef>
+              <a:effectRef idx="0">
+                <a:schemeClr val="accent1"/>
+              </a:effectRef>
+              <a:fontRef idx="minor">
+                <a:schemeClr val="tx1"/>
+              </a:fontRef>
+            </p:style>
+          </p:cxnSp>
+          <p:sp>
+            <p:nvSpPr>
+              <p:cNvPr id="17" name="Cube 48"/>
+              <p:cNvSpPr/>
+              <p:nvPr/>
+            </p:nvSpPr>
+            <p:spPr>
+              <a:xfrm>
+                <a:off x="7763717" y="2659440"/>
+                <a:ext cx="666422" cy="853939"/>
+              </a:xfrm>
+              <a:prstGeom prst="cube">
+                <a:avLst>
+                  <a:gd name="adj" fmla="val 36691"/>
+                </a:avLst>
+              </a:prstGeom>
+              <a:solidFill>
+                <a:srgbClr val="B3E2CD"/>
+              </a:solidFill>
+              <a:ln w="0">
+                <a:solidFill>
+                  <a:schemeClr val="tx1"/>
+                </a:solidFill>
+              </a:ln>
+            </p:spPr>
+            <p:style>
+              <a:lnRef idx="2">
+                <a:schemeClr val="accent1">
+                  <a:shade val="50000"/>
+                </a:schemeClr>
+              </a:lnRef>
+              <a:fillRef idx="1">
+                <a:schemeClr val="accent1"/>
+              </a:fillRef>
+              <a:effectRef idx="0">
+                <a:schemeClr val="accent1"/>
+              </a:effectRef>
+              <a:fontRef idx="minor">
+                <a:schemeClr val="lt1"/>
+              </a:fontRef>
+            </p:style>
+            <p:txBody>
+              <a:bodyPr rtlCol="0" anchor="ctr"/>
+              <a:lstStyle/>
+              <a:p>
+                <a:pPr algn="ctr"/>
+                <a:endParaRPr lang="en-US" sz="2000">
+                  <a:latin typeface="Times New Roman" panose="02020603050405020304" pitchFamily="18" charset="0"/>
+                  <a:cs typeface="Times New Roman" panose="02020603050405020304" pitchFamily="18" charset="0"/>
+                </a:endParaRPr>
+              </a:p>
+            </p:txBody>
+          </p:sp>
+          <p:cxnSp>
+            <p:nvCxnSpPr>
+              <p:cNvPr id="21" name="直线箭头连接符 20"/>
+              <p:cNvCxnSpPr/>
+              <p:nvPr/>
+            </p:nvCxnSpPr>
+            <p:spPr>
+              <a:xfrm>
+                <a:off x="7174230" y="3040996"/>
+                <a:ext cx="566627" cy="0"/>
+              </a:xfrm>
+              <a:prstGeom prst="straightConnector1">
+                <a:avLst/>
+              </a:prstGeom>
+              <a:ln w="38100">
+                <a:prstDash val="solid"/>
+                <a:tailEnd type="triangle"/>
+              </a:ln>
+            </p:spPr>
+            <p:style>
+              <a:lnRef idx="1">
+                <a:schemeClr val="accent1"/>
+              </a:lnRef>
+              <a:fillRef idx="0">
+                <a:schemeClr val="accent1"/>
+              </a:fillRef>
+              <a:effectRef idx="0">
+                <a:schemeClr val="accent1"/>
+              </a:effectRef>
+              <a:fontRef idx="minor">
+                <a:schemeClr val="tx1"/>
+              </a:fontRef>
+            </p:style>
+          </p:cxnSp>
+          <p:grpSp>
+            <p:nvGrpSpPr>
+              <p:cNvPr id="30" name="组 29"/>
+              <p:cNvGrpSpPr/>
+              <p:nvPr/>
+            </p:nvGrpSpPr>
+            <p:grpSpPr>
+              <a:xfrm>
+                <a:off x="6168390" y="2434590"/>
+                <a:ext cx="1146810" cy="632768"/>
+                <a:chOff x="6842760" y="2434590"/>
+                <a:chExt cx="1146810" cy="632768"/>
+              </a:xfrm>
+            </p:grpSpPr>
+            <p:cxnSp>
+              <p:nvCxnSpPr>
+                <p:cNvPr id="23" name="直线连接符 22"/>
+                <p:cNvCxnSpPr/>
+                <p:nvPr/>
+              </p:nvCxnSpPr>
+              <p:spPr>
+                <a:xfrm flipV="1">
+                  <a:off x="6842760" y="2434590"/>
+                  <a:ext cx="0" cy="632768"/>
+                </a:xfrm>
+                <a:prstGeom prst="line">
+                  <a:avLst/>
+                </a:prstGeom>
+                <a:ln w="38100"/>
+              </p:spPr>
+              <p:style>
+                <a:lnRef idx="1">
+                  <a:schemeClr val="accent1"/>
+                </a:lnRef>
+                <a:fillRef idx="0">
+                  <a:schemeClr val="accent1"/>
+                </a:fillRef>
+                <a:effectRef idx="0">
+                  <a:schemeClr val="accent1"/>
+                </a:effectRef>
+                <a:fontRef idx="minor">
+                  <a:schemeClr val="tx1"/>
+                </a:fontRef>
+              </p:style>
+            </p:cxnSp>
+            <p:cxnSp>
+              <p:nvCxnSpPr>
+                <p:cNvPr id="26" name="直线连接符 25"/>
+                <p:cNvCxnSpPr/>
+                <p:nvPr/>
+              </p:nvCxnSpPr>
+              <p:spPr>
+                <a:xfrm>
+                  <a:off x="6842760" y="2446020"/>
+                  <a:ext cx="1146810" cy="0"/>
+                </a:xfrm>
+                <a:prstGeom prst="line">
+                  <a:avLst/>
+                </a:prstGeom>
+                <a:ln w="38100"/>
+              </p:spPr>
+              <p:style>
+                <a:lnRef idx="1">
+                  <a:schemeClr val="accent1"/>
+                </a:lnRef>
+                <a:fillRef idx="0">
+                  <a:schemeClr val="accent1"/>
+                </a:fillRef>
+                <a:effectRef idx="0">
+                  <a:schemeClr val="accent1"/>
+                </a:effectRef>
+                <a:fontRef idx="minor">
+                  <a:schemeClr val="tx1"/>
+                </a:fontRef>
+              </p:style>
+            </p:cxnSp>
+            <p:cxnSp>
+              <p:nvCxnSpPr>
+                <p:cNvPr id="28" name="直线箭头连接符 27"/>
+                <p:cNvCxnSpPr/>
+                <p:nvPr/>
+              </p:nvCxnSpPr>
+              <p:spPr>
+                <a:xfrm>
+                  <a:off x="7989570" y="2434590"/>
+                  <a:ext cx="0" cy="606406"/>
+                </a:xfrm>
+                <a:prstGeom prst="straightConnector1">
+                  <a:avLst/>
+                </a:prstGeom>
+                <a:ln w="38100">
+                  <a:tailEnd type="triangle"/>
+                </a:ln>
+              </p:spPr>
+              <p:style>
+                <a:lnRef idx="1">
+                  <a:schemeClr val="accent1"/>
+                </a:lnRef>
+                <a:fillRef idx="0">
+                  <a:schemeClr val="accent1"/>
+                </a:fillRef>
+                <a:effectRef idx="0">
+                  <a:schemeClr val="accent1"/>
+                </a:effectRef>
+                <a:fontRef idx="minor">
+                  <a:schemeClr val="tx1"/>
+                </a:fontRef>
+              </p:style>
+            </p:cxnSp>
+          </p:grpSp>
+          <p:cxnSp>
+            <p:nvCxnSpPr>
+              <p:cNvPr id="32" name="直线箭头连接符 31"/>
+              <p:cNvCxnSpPr/>
+              <p:nvPr/>
+            </p:nvCxnSpPr>
+            <p:spPr>
+              <a:xfrm>
+                <a:off x="8452999" y="3067358"/>
+                <a:ext cx="566337" cy="0"/>
+              </a:xfrm>
+              <a:prstGeom prst="straightConnector1">
+                <a:avLst/>
+              </a:prstGeom>
+              <a:ln w="38100">
+                <a:prstDash val="solid"/>
+                <a:tailEnd type="triangle"/>
+              </a:ln>
+            </p:spPr>
+            <p:style>
+              <a:lnRef idx="1">
+                <a:schemeClr val="accent1"/>
+              </a:lnRef>
+              <a:fillRef idx="0">
+                <a:schemeClr val="accent1"/>
+              </a:fillRef>
+              <a:effectRef idx="0">
+                <a:schemeClr val="accent1"/>
+              </a:effectRef>
+              <a:fontRef idx="minor">
+                <a:schemeClr val="tx1"/>
+              </a:fontRef>
+            </p:style>
+          </p:cxnSp>
+          <p:grpSp>
+            <p:nvGrpSpPr>
+              <p:cNvPr id="33" name="组 32"/>
+              <p:cNvGrpSpPr/>
+              <p:nvPr/>
+            </p:nvGrpSpPr>
+            <p:grpSpPr>
+              <a:xfrm>
+                <a:off x="8752636" y="2434590"/>
+                <a:ext cx="1146810" cy="632768"/>
+                <a:chOff x="6842760" y="2434590"/>
+                <a:chExt cx="1146810" cy="632768"/>
+              </a:xfrm>
+            </p:grpSpPr>
+            <p:cxnSp>
+              <p:nvCxnSpPr>
+                <p:cNvPr id="34" name="直线连接符 33"/>
+                <p:cNvCxnSpPr/>
+                <p:nvPr/>
+              </p:nvCxnSpPr>
+              <p:spPr>
+                <a:xfrm flipV="1">
+                  <a:off x="6842760" y="2434590"/>
+                  <a:ext cx="0" cy="632768"/>
+                </a:xfrm>
+                <a:prstGeom prst="line">
+                  <a:avLst/>
+                </a:prstGeom>
+                <a:ln w="38100"/>
+              </p:spPr>
+              <p:style>
+                <a:lnRef idx="1">
+                  <a:schemeClr val="accent1"/>
+                </a:lnRef>
+                <a:fillRef idx="0">
+                  <a:schemeClr val="accent1"/>
+                </a:fillRef>
+                <a:effectRef idx="0">
+                  <a:schemeClr val="accent1"/>
+                </a:effectRef>
+                <a:fontRef idx="minor">
+                  <a:schemeClr val="tx1"/>
+                </a:fontRef>
+              </p:style>
+            </p:cxnSp>
+            <p:cxnSp>
+              <p:nvCxnSpPr>
+                <p:cNvPr id="35" name="直线连接符 34"/>
+                <p:cNvCxnSpPr/>
+                <p:nvPr/>
+              </p:nvCxnSpPr>
+              <p:spPr>
+                <a:xfrm>
+                  <a:off x="6842760" y="2446020"/>
+                  <a:ext cx="1146810" cy="0"/>
+                </a:xfrm>
+                <a:prstGeom prst="line">
+                  <a:avLst/>
+                </a:prstGeom>
+                <a:ln w="38100"/>
+              </p:spPr>
+              <p:style>
+                <a:lnRef idx="1">
+                  <a:schemeClr val="accent1"/>
+                </a:lnRef>
+                <a:fillRef idx="0">
+                  <a:schemeClr val="accent1"/>
+                </a:fillRef>
+                <a:effectRef idx="0">
+                  <a:schemeClr val="accent1"/>
+                </a:effectRef>
+                <a:fontRef idx="minor">
+                  <a:schemeClr val="tx1"/>
+                </a:fontRef>
+              </p:style>
+            </p:cxnSp>
+            <p:cxnSp>
+              <p:nvCxnSpPr>
+                <p:cNvPr id="36" name="直线箭头连接符 35"/>
+                <p:cNvCxnSpPr/>
+                <p:nvPr/>
+              </p:nvCxnSpPr>
+              <p:spPr>
+                <a:xfrm>
+                  <a:off x="7989570" y="2434590"/>
+                  <a:ext cx="0" cy="606406"/>
+                </a:xfrm>
+                <a:prstGeom prst="straightConnector1">
+                  <a:avLst/>
+                </a:prstGeom>
+                <a:ln w="38100">
+                  <a:tailEnd type="triangle"/>
+                </a:ln>
+              </p:spPr>
+              <p:style>
+                <a:lnRef idx="1">
+                  <a:schemeClr val="accent1"/>
+                </a:lnRef>
+                <a:fillRef idx="0">
+                  <a:schemeClr val="accent1"/>
+                </a:fillRef>
+                <a:effectRef idx="0">
+                  <a:schemeClr val="accent1"/>
+                </a:effectRef>
+                <a:fontRef idx="minor">
+                  <a:schemeClr val="tx1"/>
+                </a:fontRef>
+              </p:style>
+            </p:cxnSp>
+          </p:grpSp>
+          <p:grpSp>
+            <p:nvGrpSpPr>
+              <p:cNvPr id="37" name="组 36"/>
+              <p:cNvGrpSpPr/>
+              <p:nvPr/>
+            </p:nvGrpSpPr>
+            <p:grpSpPr>
+              <a:xfrm>
+                <a:off x="7482217" y="2421409"/>
+                <a:ext cx="1146810" cy="645949"/>
+                <a:chOff x="6842760" y="2434590"/>
+                <a:chExt cx="1146810" cy="645949"/>
+              </a:xfrm>
+            </p:grpSpPr>
+            <p:cxnSp>
+              <p:nvCxnSpPr>
+                <p:cNvPr id="38" name="直线连接符 37"/>
+                <p:cNvCxnSpPr/>
+                <p:nvPr/>
+              </p:nvCxnSpPr>
+              <p:spPr>
+                <a:xfrm flipV="1">
+                  <a:off x="6842760" y="2434590"/>
+                  <a:ext cx="0" cy="632768"/>
+                </a:xfrm>
+                <a:prstGeom prst="line">
+                  <a:avLst/>
+                </a:prstGeom>
+                <a:ln w="38100"/>
+              </p:spPr>
+              <p:style>
+                <a:lnRef idx="1">
+                  <a:schemeClr val="accent1"/>
+                </a:lnRef>
+                <a:fillRef idx="0">
+                  <a:schemeClr val="accent1"/>
+                </a:fillRef>
+                <a:effectRef idx="0">
+                  <a:schemeClr val="accent1"/>
+                </a:effectRef>
+                <a:fontRef idx="minor">
+                  <a:schemeClr val="tx1"/>
+                </a:fontRef>
+              </p:style>
+            </p:cxnSp>
+            <p:cxnSp>
+              <p:nvCxnSpPr>
+                <p:cNvPr id="39" name="直线连接符 38"/>
+                <p:cNvCxnSpPr/>
+                <p:nvPr/>
+              </p:nvCxnSpPr>
+              <p:spPr>
+                <a:xfrm>
+                  <a:off x="6842760" y="2446020"/>
+                  <a:ext cx="1146810" cy="0"/>
+                </a:xfrm>
+                <a:prstGeom prst="line">
+                  <a:avLst/>
+                </a:prstGeom>
+                <a:ln w="38100"/>
+              </p:spPr>
+              <p:style>
+                <a:lnRef idx="1">
+                  <a:schemeClr val="accent1"/>
+                </a:lnRef>
+                <a:fillRef idx="0">
+                  <a:schemeClr val="accent1"/>
+                </a:fillRef>
+                <a:effectRef idx="0">
+                  <a:schemeClr val="accent1"/>
+                </a:effectRef>
+                <a:fontRef idx="minor">
+                  <a:schemeClr val="tx1"/>
+                </a:fontRef>
+              </p:style>
+            </p:cxnSp>
+            <p:cxnSp>
+              <p:nvCxnSpPr>
+                <p:cNvPr id="40" name="直线箭头连接符 39"/>
+                <p:cNvCxnSpPr/>
+                <p:nvPr/>
+              </p:nvCxnSpPr>
+              <p:spPr>
+                <a:xfrm>
+                  <a:off x="7989570" y="2434590"/>
+                  <a:ext cx="0" cy="645949"/>
+                </a:xfrm>
+                <a:prstGeom prst="straightConnector1">
+                  <a:avLst/>
+                </a:prstGeom>
+                <a:ln w="38100">
+                  <a:tailEnd type="triangle"/>
+                </a:ln>
+              </p:spPr>
+              <p:style>
+                <a:lnRef idx="1">
+                  <a:schemeClr val="accent1"/>
+                </a:lnRef>
+                <a:fillRef idx="0">
+                  <a:schemeClr val="accent1"/>
+                </a:fillRef>
+                <a:effectRef idx="0">
+                  <a:schemeClr val="accent1"/>
+                </a:effectRef>
+                <a:fontRef idx="minor">
+                  <a:schemeClr val="tx1"/>
+                </a:fontRef>
+              </p:style>
+            </p:cxnSp>
+          </p:grpSp>
+          <p:cxnSp>
+            <p:nvCxnSpPr>
+              <p:cNvPr id="47" name="直线箭头连接符 46"/>
+              <p:cNvCxnSpPr/>
+              <p:nvPr/>
+            </p:nvCxnSpPr>
+            <p:spPr>
+              <a:xfrm>
+                <a:off x="9756552" y="3039245"/>
+                <a:ext cx="566337" cy="0"/>
+              </a:xfrm>
+              <a:prstGeom prst="straightConnector1">
+                <a:avLst/>
+              </a:prstGeom>
+              <a:ln w="38100">
+                <a:prstDash val="solid"/>
+                <a:tailEnd type="triangle"/>
+              </a:ln>
+            </p:spPr>
+            <p:style>
+              <a:lnRef idx="1">
+                <a:schemeClr val="accent1"/>
+              </a:lnRef>
+              <a:fillRef idx="0">
+                <a:schemeClr val="accent1"/>
+              </a:fillRef>
+              <a:effectRef idx="0">
+                <a:schemeClr val="accent1"/>
+              </a:effectRef>
+              <a:fontRef idx="minor">
+                <a:schemeClr val="tx1"/>
+              </a:fontRef>
+            </p:style>
+          </p:cxnSp>
+        </p:grpSp>
+        <p:sp>
+          <p:nvSpPr>
+            <p:cNvPr id="48" name="文本框 47"/>
+            <p:cNvSpPr txBox="1"/>
+            <p:nvPr/>
+          </p:nvSpPr>
+          <p:spPr>
+            <a:xfrm>
+              <a:off x="10277169" y="2823344"/>
+              <a:ext cx="1673531" cy="461665"/>
+            </a:xfrm>
+            <a:prstGeom prst="rect">
+              <a:avLst/>
+            </a:prstGeom>
+            <a:noFill/>
+          </p:spPr>
+          <p:txBody>
+            <a:bodyPr wrap="square" rtlCol="0">
+              <a:spAutoFit/>
+            </a:bodyPr>
+            <a:lstStyle/>
+            <a:p>
+              <a:r>
+                <a:rPr kumimoji="1" lang="en-US" altLang="zh-CN" sz="2400" dirty="0" err="1" smtClean="0"/>
+                <a:t>Upsample</a:t>
+              </a:r>
+              <a:endParaRPr kumimoji="1" lang="zh-CN" altLang="en-US" sz="2400" dirty="0"/>
+            </a:p>
+          </p:txBody>
+        </p:sp>
+      </p:grpSp>
+    </p:spTree>
+    <p:extLst>
+      <p:ext uri="{BB962C8B-B14F-4D97-AF65-F5344CB8AC3E}">
+        <p14:creationId xmlns:p14="http://schemas.microsoft.com/office/powerpoint/2010/main" val="478034945"/>
+      </p:ext>
+    </p:extLst>
+  </p:cSld>
+  <p:clrMapOvr>
+    <a:masterClrMapping/>
+  </p:clrMapOvr>
+</p:sld>
+</file>
+
+<file path=ppt/slides/slide12.xml><?xml version="1.0" encoding="utf-8"?>
+<p:sld xmlns:a="http://schemas.openxmlformats.org/drawingml/2006/main" xmlns:r="http://schemas.openxmlformats.org/officeDocument/2006/relationships" xmlns:p="http://schemas.openxmlformats.org/presentationml/2006/main">
+  <p:cSld>
+    <p:spTree>
+      <p:nvGrpSpPr>
+        <p:cNvPr id="1" name=""/>
+        <p:cNvGrpSpPr/>
+        <p:nvPr/>
+      </p:nvGrpSpPr>
+      <p:grpSpPr>
+        <a:xfrm>
+          <a:off x="0" y="0"/>
+          <a:ext cx="0" cy="0"/>
+          <a:chOff x="0" y="0"/>
+          <a:chExt cx="0" cy="0"/>
+        </a:xfrm>
+      </p:grpSpPr>
+      <p:grpSp>
+        <p:nvGrpSpPr>
+          <p:cNvPr id="9" name="组 8"/>
+          <p:cNvGrpSpPr/>
+          <p:nvPr/>
+        </p:nvGrpSpPr>
+        <p:grpSpPr>
+          <a:xfrm>
+            <a:off x="521851" y="2260360"/>
+            <a:ext cx="11530449" cy="1253020"/>
+            <a:chOff x="521851" y="2260360"/>
+            <a:chExt cx="11530449" cy="1253020"/>
+          </a:xfrm>
+        </p:grpSpPr>
+        <p:grpSp>
+          <p:nvGrpSpPr>
+            <p:cNvPr id="8" name="组 7"/>
+            <p:cNvGrpSpPr/>
+            <p:nvPr/>
+          </p:nvGrpSpPr>
+          <p:grpSpPr>
+            <a:xfrm>
+              <a:off x="2991323" y="2659441"/>
+              <a:ext cx="2798576" cy="853939"/>
+              <a:chOff x="3665693" y="2659441"/>
+              <a:chExt cx="2798576" cy="853939"/>
+            </a:xfrm>
+          </p:grpSpPr>
+          <p:sp>
+            <p:nvSpPr>
+              <p:cNvPr id="4" name="Cube 48"/>
+              <p:cNvSpPr/>
+              <p:nvPr/>
+            </p:nvSpPr>
+            <p:spPr>
+              <a:xfrm>
+                <a:off x="3665693" y="2659441"/>
+                <a:ext cx="733796" cy="853939"/>
+              </a:xfrm>
+              <a:prstGeom prst="cube">
+                <a:avLst>
+                  <a:gd name="adj" fmla="val 36691"/>
+                </a:avLst>
+              </a:prstGeom>
+              <a:solidFill>
+                <a:srgbClr val="FFC000"/>
+              </a:solidFill>
+              <a:ln w="0">
+                <a:solidFill>
+                  <a:schemeClr val="tx1"/>
+                </a:solidFill>
+              </a:ln>
+            </p:spPr>
+            <p:style>
+              <a:lnRef idx="2">
+                <a:schemeClr val="accent1">
+                  <a:shade val="50000"/>
+                </a:schemeClr>
+              </a:lnRef>
+              <a:fillRef idx="1">
+                <a:schemeClr val="accent1"/>
+              </a:fillRef>
+              <a:effectRef idx="0">
+                <a:schemeClr val="accent1"/>
+              </a:effectRef>
+              <a:fontRef idx="minor">
+                <a:schemeClr val="lt1"/>
+              </a:fontRef>
+            </p:style>
+            <p:txBody>
+              <a:bodyPr rtlCol="0" anchor="ctr"/>
+              <a:lstStyle/>
+              <a:p>
+                <a:pPr algn="ctr"/>
+                <a:endParaRPr lang="en-US" sz="2000">
+                  <a:latin typeface="Times New Roman" panose="02020603050405020304" pitchFamily="18" charset="0"/>
+                  <a:cs typeface="Times New Roman" panose="02020603050405020304" pitchFamily="18" charset="0"/>
+                </a:endParaRPr>
+              </a:p>
+            </p:txBody>
+          </p:sp>
+          <p:sp>
+            <p:nvSpPr>
+              <p:cNvPr id="5" name="Cube 48"/>
+              <p:cNvSpPr/>
+              <p:nvPr/>
+            </p:nvSpPr>
+            <p:spPr>
+              <a:xfrm>
+                <a:off x="4313488" y="2659441"/>
+                <a:ext cx="666422" cy="853939"/>
+              </a:xfrm>
+              <a:prstGeom prst="cube">
+                <a:avLst>
+                  <a:gd name="adj" fmla="val 36691"/>
+                </a:avLst>
+              </a:prstGeom>
+              <a:solidFill>
+                <a:srgbClr val="FFC000"/>
+              </a:solidFill>
+              <a:ln w="0">
+                <a:solidFill>
+                  <a:schemeClr val="tx1"/>
+                </a:solidFill>
+              </a:ln>
+            </p:spPr>
+            <p:style>
+              <a:lnRef idx="2">
+                <a:schemeClr val="accent1">
+                  <a:shade val="50000"/>
+                </a:schemeClr>
+              </a:lnRef>
+              <a:fillRef idx="1">
+                <a:schemeClr val="accent1"/>
+              </a:fillRef>
+              <a:effectRef idx="0">
+                <a:schemeClr val="accent1"/>
+              </a:effectRef>
+              <a:fontRef idx="minor">
+                <a:schemeClr val="lt1"/>
+              </a:fontRef>
+            </p:style>
+            <p:txBody>
+              <a:bodyPr rtlCol="0" anchor="ctr"/>
+              <a:lstStyle/>
+              <a:p>
+                <a:pPr algn="ctr"/>
+                <a:endParaRPr lang="en-US" sz="2000">
+                  <a:latin typeface="Times New Roman" panose="02020603050405020304" pitchFamily="18" charset="0"/>
+                  <a:cs typeface="Times New Roman" panose="02020603050405020304" pitchFamily="18" charset="0"/>
+                </a:endParaRPr>
+              </a:p>
+            </p:txBody>
+          </p:sp>
+          <p:sp>
+            <p:nvSpPr>
+              <p:cNvPr id="6" name="文本框 5"/>
+              <p:cNvSpPr txBox="1"/>
+              <p:nvPr/>
+            </p:nvSpPr>
+            <p:spPr>
+              <a:xfrm>
+                <a:off x="5048446" y="3000991"/>
+                <a:ext cx="1279581" cy="307777"/>
+              </a:xfrm>
+              <a:prstGeom prst="rect">
+                <a:avLst/>
+              </a:prstGeom>
+              <a:noFill/>
+            </p:spPr>
+            <p:txBody>
+              <a:bodyPr wrap="square" rtlCol="0">
+                <a:spAutoFit/>
+              </a:bodyPr>
+              <a:lstStyle/>
+              <a:p>
+                <a:r>
+                  <a:rPr kumimoji="1" lang="zh-CN" altLang="en-US" sz="1400" dirty="0" smtClean="0"/>
+                  <a:t>●●●</a:t>
+                </a:r>
+                <a:endParaRPr kumimoji="1" lang="zh-CN" altLang="en-US" sz="1400" dirty="0"/>
+              </a:p>
+            </p:txBody>
+          </p:sp>
+          <p:sp>
+            <p:nvSpPr>
+              <p:cNvPr id="7" name="Cube 48"/>
+              <p:cNvSpPr/>
+              <p:nvPr/>
+            </p:nvSpPr>
+            <p:spPr>
+              <a:xfrm>
+                <a:off x="5797847" y="2659441"/>
+                <a:ext cx="666422" cy="853939"/>
+              </a:xfrm>
+              <a:prstGeom prst="cube">
+                <a:avLst>
+                  <a:gd name="adj" fmla="val 36691"/>
+                </a:avLst>
+              </a:prstGeom>
+              <a:solidFill>
+                <a:srgbClr val="FFC000"/>
+              </a:solidFill>
+              <a:ln w="0">
+                <a:solidFill>
+                  <a:schemeClr val="tx1"/>
+                </a:solidFill>
+              </a:ln>
+            </p:spPr>
+            <p:style>
+              <a:lnRef idx="2">
+                <a:schemeClr val="accent1">
+                  <a:shade val="50000"/>
+                </a:schemeClr>
+              </a:lnRef>
+              <a:fillRef idx="1">
+                <a:schemeClr val="accent1"/>
+              </a:fillRef>
+              <a:effectRef idx="0">
+                <a:schemeClr val="accent1"/>
+              </a:effectRef>
+              <a:fontRef idx="minor">
+                <a:schemeClr val="lt1"/>
+              </a:fontRef>
+            </p:style>
+            <p:txBody>
+              <a:bodyPr rtlCol="0" anchor="ctr"/>
+              <a:lstStyle/>
+              <a:p>
+                <a:pPr algn="ctr"/>
+                <a:endParaRPr lang="en-US" sz="2000">
+                  <a:latin typeface="Times New Roman" panose="02020603050405020304" pitchFamily="18" charset="0"/>
+                  <a:cs typeface="Times New Roman" panose="02020603050405020304" pitchFamily="18" charset="0"/>
+                </a:endParaRPr>
+              </a:p>
+            </p:txBody>
+          </p:sp>
+        </p:grpSp>
+        <p:cxnSp>
+          <p:nvCxnSpPr>
+            <p:cNvPr id="10" name="直线箭头连接符 9"/>
+            <p:cNvCxnSpPr/>
+            <p:nvPr/>
+          </p:nvCxnSpPr>
+          <p:spPr>
+            <a:xfrm>
+              <a:off x="2400300" y="3177540"/>
+              <a:ext cx="537210" cy="0"/>
+            </a:xfrm>
+            <a:prstGeom prst="straightConnector1">
+              <a:avLst/>
+            </a:prstGeom>
+            <a:ln w="38100">
+              <a:prstDash val="solid"/>
+              <a:tailEnd type="triangle"/>
+            </a:ln>
+          </p:spPr>
+          <p:style>
+            <a:lnRef idx="1">
+              <a:schemeClr val="accent1"/>
+            </a:lnRef>
+            <a:fillRef idx="0">
+              <a:schemeClr val="accent1"/>
+            </a:fillRef>
+            <a:effectRef idx="0">
+              <a:schemeClr val="accent1"/>
+            </a:effectRef>
+            <a:fontRef idx="minor">
+              <a:schemeClr val="tx1"/>
+            </a:fontRef>
+          </p:style>
+        </p:cxnSp>
+        <p:sp>
+          <p:nvSpPr>
+            <p:cNvPr id="12" name="文本框 11"/>
+            <p:cNvSpPr txBox="1"/>
+            <p:nvPr/>
+          </p:nvSpPr>
+          <p:spPr>
+            <a:xfrm>
+              <a:off x="521851" y="2936746"/>
+              <a:ext cx="2099783" cy="461665"/>
+            </a:xfrm>
+            <a:prstGeom prst="rect">
+              <a:avLst/>
+            </a:prstGeom>
+            <a:noFill/>
+          </p:spPr>
+          <p:txBody>
+            <a:bodyPr wrap="square" rtlCol="0">
+              <a:spAutoFit/>
+            </a:bodyPr>
+            <a:lstStyle/>
+            <a:p>
+              <a:r>
+                <a:rPr kumimoji="1" lang="en-US" altLang="zh-CN" sz="2400" dirty="0" err="1" smtClean="0"/>
+                <a:t>Downsample</a:t>
+              </a:r>
+              <a:endParaRPr kumimoji="1" lang="zh-CN" altLang="en-US" sz="2400" dirty="0"/>
+            </a:p>
+          </p:txBody>
+        </p:sp>
+        <p:sp>
+          <p:nvSpPr>
+            <p:cNvPr id="48" name="文本框 47"/>
+            <p:cNvSpPr txBox="1"/>
+            <p:nvPr/>
+          </p:nvSpPr>
+          <p:spPr>
+            <a:xfrm>
+              <a:off x="10277169" y="2823344"/>
+              <a:ext cx="1775131" cy="461665"/>
+            </a:xfrm>
+            <a:prstGeom prst="rect">
+              <a:avLst/>
+            </a:prstGeom>
+            <a:noFill/>
+          </p:spPr>
+          <p:txBody>
+            <a:bodyPr wrap="square" rtlCol="0">
+              <a:spAutoFit/>
+            </a:bodyPr>
+            <a:lstStyle/>
+            <a:p>
+              <a:r>
+                <a:rPr kumimoji="1" lang="en-US" altLang="zh-CN" sz="2400" smtClean="0"/>
+                <a:t>Upsample</a:t>
+              </a:r>
+              <a:endParaRPr kumimoji="1" lang="zh-CN" altLang="en-US" sz="2400" dirty="0"/>
+            </a:p>
+          </p:txBody>
+        </p:sp>
+        <p:grpSp>
+          <p:nvGrpSpPr>
+            <p:cNvPr id="3" name="组 2"/>
+            <p:cNvGrpSpPr/>
+            <p:nvPr/>
+          </p:nvGrpSpPr>
+          <p:grpSpPr>
+            <a:xfrm>
+              <a:off x="5875020" y="2260360"/>
+              <a:ext cx="4447869" cy="1253019"/>
+              <a:chOff x="5875020" y="2260360"/>
+              <a:chExt cx="4447869" cy="1253019"/>
+            </a:xfrm>
+          </p:grpSpPr>
+          <p:sp>
+            <p:nvSpPr>
+              <p:cNvPr id="14" name="Cube 48"/>
+              <p:cNvSpPr/>
+              <p:nvPr/>
+            </p:nvSpPr>
+            <p:spPr>
+              <a:xfrm>
+                <a:off x="6471594" y="2659440"/>
+                <a:ext cx="666422" cy="853939"/>
+              </a:xfrm>
+              <a:prstGeom prst="cube">
+                <a:avLst>
+                  <a:gd name="adj" fmla="val 36691"/>
+                </a:avLst>
+              </a:prstGeom>
+              <a:solidFill>
+                <a:srgbClr val="B3E2CD"/>
+              </a:solidFill>
+              <a:ln w="0">
+                <a:solidFill>
+                  <a:schemeClr val="tx1"/>
+                </a:solidFill>
+              </a:ln>
+            </p:spPr>
+            <p:style>
+              <a:lnRef idx="2">
+                <a:schemeClr val="accent1">
+                  <a:shade val="50000"/>
+                </a:schemeClr>
+              </a:lnRef>
+              <a:fillRef idx="1">
+                <a:schemeClr val="accent1"/>
+              </a:fillRef>
+              <a:effectRef idx="0">
+                <a:schemeClr val="accent1"/>
+              </a:effectRef>
+              <a:fontRef idx="minor">
+                <a:schemeClr val="lt1"/>
+              </a:fontRef>
+            </p:style>
+            <p:txBody>
+              <a:bodyPr rtlCol="0" anchor="ctr"/>
+              <a:lstStyle/>
+              <a:p>
+                <a:pPr algn="ctr"/>
+                <a:endParaRPr lang="en-US" sz="2000">
+                  <a:latin typeface="Times New Roman" panose="02020603050405020304" pitchFamily="18" charset="0"/>
+                  <a:cs typeface="Times New Roman" panose="02020603050405020304" pitchFamily="18" charset="0"/>
+                </a:endParaRPr>
+              </a:p>
+            </p:txBody>
+          </p:sp>
+          <p:cxnSp>
+            <p:nvCxnSpPr>
+              <p:cNvPr id="15" name="直线箭头连接符 14"/>
+              <p:cNvCxnSpPr/>
+              <p:nvPr/>
+            </p:nvCxnSpPr>
+            <p:spPr>
+              <a:xfrm>
+                <a:off x="5875020" y="3067358"/>
+                <a:ext cx="596574" cy="0"/>
+              </a:xfrm>
+              <a:prstGeom prst="straightConnector1">
+                <a:avLst/>
+              </a:prstGeom>
+              <a:ln w="38100">
+                <a:prstDash val="solid"/>
+                <a:tailEnd type="triangle"/>
+              </a:ln>
+            </p:spPr>
+            <p:style>
+              <a:lnRef idx="1">
+                <a:schemeClr val="accent1"/>
+              </a:lnRef>
+              <a:fillRef idx="0">
+                <a:schemeClr val="accent1"/>
+              </a:fillRef>
+              <a:effectRef idx="0">
+                <a:schemeClr val="accent1"/>
+              </a:effectRef>
+              <a:fontRef idx="minor">
+                <a:schemeClr val="tx1"/>
+              </a:fontRef>
+            </p:style>
+          </p:cxnSp>
+          <p:sp>
+            <p:nvSpPr>
+              <p:cNvPr id="17" name="Cube 48"/>
+              <p:cNvSpPr/>
+              <p:nvPr/>
+            </p:nvSpPr>
+            <p:spPr>
+              <a:xfrm>
+                <a:off x="7763717" y="2659440"/>
+                <a:ext cx="666422" cy="853939"/>
+              </a:xfrm>
+              <a:prstGeom prst="cube">
+                <a:avLst>
+                  <a:gd name="adj" fmla="val 36691"/>
+                </a:avLst>
+              </a:prstGeom>
+              <a:solidFill>
+                <a:srgbClr val="B3E2CD"/>
+              </a:solidFill>
+              <a:ln w="0">
+                <a:solidFill>
+                  <a:schemeClr val="tx1"/>
+                </a:solidFill>
+              </a:ln>
+            </p:spPr>
+            <p:style>
+              <a:lnRef idx="2">
+                <a:schemeClr val="accent1">
+                  <a:shade val="50000"/>
+                </a:schemeClr>
+              </a:lnRef>
+              <a:fillRef idx="1">
+                <a:schemeClr val="accent1"/>
+              </a:fillRef>
+              <a:effectRef idx="0">
+                <a:schemeClr val="accent1"/>
+              </a:effectRef>
+              <a:fontRef idx="minor">
+                <a:schemeClr val="lt1"/>
+              </a:fontRef>
+            </p:style>
+            <p:txBody>
+              <a:bodyPr rtlCol="0" anchor="ctr"/>
+              <a:lstStyle/>
+              <a:p>
+                <a:pPr algn="ctr"/>
+                <a:endParaRPr lang="en-US" sz="2000">
+                  <a:latin typeface="Times New Roman" panose="02020603050405020304" pitchFamily="18" charset="0"/>
+                  <a:cs typeface="Times New Roman" panose="02020603050405020304" pitchFamily="18" charset="0"/>
+                </a:endParaRPr>
+              </a:p>
+            </p:txBody>
+          </p:sp>
+          <p:cxnSp>
+            <p:nvCxnSpPr>
+              <p:cNvPr id="21" name="直线箭头连接符 20"/>
+              <p:cNvCxnSpPr/>
+              <p:nvPr/>
+            </p:nvCxnSpPr>
+            <p:spPr>
+              <a:xfrm>
+                <a:off x="7174230" y="3066396"/>
+                <a:ext cx="566627" cy="0"/>
+              </a:xfrm>
+              <a:prstGeom prst="straightConnector1">
+                <a:avLst/>
+              </a:prstGeom>
+              <a:ln w="38100">
+                <a:prstDash val="solid"/>
+                <a:tailEnd type="triangle"/>
+              </a:ln>
+            </p:spPr>
+            <p:style>
+              <a:lnRef idx="1">
+                <a:schemeClr val="accent1"/>
+              </a:lnRef>
+              <a:fillRef idx="0">
+                <a:schemeClr val="accent1"/>
+              </a:fillRef>
+              <a:effectRef idx="0">
+                <a:schemeClr val="accent1"/>
+              </a:effectRef>
+              <a:fontRef idx="minor">
+                <a:schemeClr val="tx1"/>
+              </a:fontRef>
+            </p:style>
+          </p:cxnSp>
+          <p:sp>
+            <p:nvSpPr>
+              <p:cNvPr id="31" name="Cube 48"/>
+              <p:cNvSpPr/>
+              <p:nvPr/>
+            </p:nvSpPr>
+            <p:spPr>
+              <a:xfrm>
+                <a:off x="9055840" y="2659440"/>
+                <a:ext cx="666422" cy="853939"/>
+              </a:xfrm>
+              <a:prstGeom prst="cube">
+                <a:avLst>
+                  <a:gd name="adj" fmla="val 36691"/>
+                </a:avLst>
+              </a:prstGeom>
+              <a:solidFill>
+                <a:srgbClr val="B3E2CD"/>
+              </a:solidFill>
+              <a:ln w="0">
+                <a:solidFill>
+                  <a:schemeClr val="tx1"/>
+                </a:solidFill>
+              </a:ln>
+            </p:spPr>
+            <p:style>
+              <a:lnRef idx="2">
+                <a:schemeClr val="accent1">
+                  <a:shade val="50000"/>
+                </a:schemeClr>
+              </a:lnRef>
+              <a:fillRef idx="1">
+                <a:schemeClr val="accent1"/>
+              </a:fillRef>
+              <a:effectRef idx="0">
+                <a:schemeClr val="accent1"/>
+              </a:effectRef>
+              <a:fontRef idx="minor">
+                <a:schemeClr val="lt1"/>
+              </a:fontRef>
+            </p:style>
+            <p:txBody>
+              <a:bodyPr rtlCol="0" anchor="ctr"/>
+              <a:lstStyle/>
+              <a:p>
+                <a:pPr algn="ctr"/>
+                <a:endParaRPr lang="en-US" sz="2000">
+                  <a:latin typeface="Times New Roman" panose="02020603050405020304" pitchFamily="18" charset="0"/>
+                  <a:cs typeface="Times New Roman" panose="02020603050405020304" pitchFamily="18" charset="0"/>
+                </a:endParaRPr>
+              </a:p>
+            </p:txBody>
+          </p:sp>
+          <p:cxnSp>
+            <p:nvCxnSpPr>
+              <p:cNvPr id="32" name="直线箭头连接符 31"/>
+              <p:cNvCxnSpPr/>
+              <p:nvPr/>
+            </p:nvCxnSpPr>
+            <p:spPr>
+              <a:xfrm>
+                <a:off x="8452999" y="3054658"/>
+                <a:ext cx="566337" cy="0"/>
+              </a:xfrm>
+              <a:prstGeom prst="straightConnector1">
+                <a:avLst/>
+              </a:prstGeom>
+              <a:ln w="38100">
+                <a:prstDash val="solid"/>
+                <a:tailEnd type="triangle"/>
+              </a:ln>
+            </p:spPr>
+            <p:style>
+              <a:lnRef idx="1">
+                <a:schemeClr val="accent1"/>
+              </a:lnRef>
+              <a:fillRef idx="0">
+                <a:schemeClr val="accent1"/>
+              </a:fillRef>
+              <a:effectRef idx="0">
+                <a:schemeClr val="accent1"/>
+              </a:effectRef>
+              <a:fontRef idx="minor">
+                <a:schemeClr val="tx1"/>
+              </a:fontRef>
+            </p:style>
+          </p:cxnSp>
+          <p:cxnSp>
+            <p:nvCxnSpPr>
+              <p:cNvPr id="47" name="直线箭头连接符 46"/>
+              <p:cNvCxnSpPr/>
+              <p:nvPr/>
+            </p:nvCxnSpPr>
+            <p:spPr>
+              <a:xfrm>
+                <a:off x="9756552" y="3051945"/>
+                <a:ext cx="566337" cy="0"/>
+              </a:xfrm>
+              <a:prstGeom prst="straightConnector1">
+                <a:avLst/>
+              </a:prstGeom>
+              <a:ln w="38100">
+                <a:prstDash val="solid"/>
+                <a:tailEnd type="triangle"/>
+              </a:ln>
+            </p:spPr>
+            <p:style>
+              <a:lnRef idx="1">
+                <a:schemeClr val="accent1"/>
+              </a:lnRef>
+              <a:fillRef idx="0">
+                <a:schemeClr val="accent1"/>
+              </a:fillRef>
+              <a:effectRef idx="0">
+                <a:schemeClr val="accent1"/>
+              </a:effectRef>
+              <a:fontRef idx="minor">
+                <a:schemeClr val="tx1"/>
+              </a:fontRef>
+            </p:style>
+          </p:cxnSp>
+          <p:sp>
+            <p:nvSpPr>
+              <p:cNvPr id="2" name="手杖形箭头 1"/>
+              <p:cNvSpPr/>
+              <p:nvPr/>
+            </p:nvSpPr>
+            <p:spPr>
+              <a:xfrm>
+                <a:off x="6260027" y="2260600"/>
+                <a:ext cx="1162842" cy="806276"/>
+              </a:xfrm>
+              <a:prstGeom prst="uturnArrow">
+                <a:avLst>
+                  <a:gd name="adj1" fmla="val 5089"/>
+                  <a:gd name="adj2" fmla="val 8628"/>
+                  <a:gd name="adj3" fmla="val 14444"/>
+                  <a:gd name="adj4" fmla="val 66707"/>
+                  <a:gd name="adj5" fmla="val 99138"/>
+                </a:avLst>
+              </a:prstGeom>
+              <a:ln>
+                <a:noFill/>
+              </a:ln>
+            </p:spPr>
+            <p:style>
+              <a:lnRef idx="2">
+                <a:schemeClr val="accent1">
+                  <a:shade val="50000"/>
+                </a:schemeClr>
+              </a:lnRef>
+              <a:fillRef idx="1">
+                <a:schemeClr val="accent1"/>
+              </a:fillRef>
+              <a:effectRef idx="0">
+                <a:schemeClr val="accent1"/>
+              </a:effectRef>
+              <a:fontRef idx="minor">
+                <a:schemeClr val="lt1"/>
+              </a:fontRef>
+            </p:style>
+            <p:txBody>
+              <a:bodyPr rtlCol="0" anchor="ctr"/>
+              <a:lstStyle/>
+              <a:p>
+                <a:pPr algn="ctr"/>
+                <a:endParaRPr kumimoji="1" lang="zh-CN" altLang="en-US">
+                  <a:solidFill>
+                    <a:schemeClr val="tx1"/>
+                  </a:solidFill>
+                </a:endParaRPr>
+              </a:p>
+            </p:txBody>
+          </p:sp>
+          <p:sp>
+            <p:nvSpPr>
+              <p:cNvPr id="20" name="手杖形箭头 19"/>
+              <p:cNvSpPr/>
+              <p:nvPr/>
+            </p:nvSpPr>
+            <p:spPr>
+              <a:xfrm>
+                <a:off x="7515507" y="2260360"/>
+                <a:ext cx="1162842" cy="806276"/>
+              </a:xfrm>
+              <a:prstGeom prst="uturnArrow">
+                <a:avLst>
+                  <a:gd name="adj1" fmla="val 5089"/>
+                  <a:gd name="adj2" fmla="val 8628"/>
+                  <a:gd name="adj3" fmla="val 14444"/>
+                  <a:gd name="adj4" fmla="val 66707"/>
+                  <a:gd name="adj5" fmla="val 99138"/>
+                </a:avLst>
+              </a:prstGeom>
+              <a:ln>
+                <a:noFill/>
+              </a:ln>
+            </p:spPr>
+            <p:style>
+              <a:lnRef idx="2">
+                <a:schemeClr val="accent1">
+                  <a:shade val="50000"/>
+                </a:schemeClr>
+              </a:lnRef>
+              <a:fillRef idx="1">
+                <a:schemeClr val="accent1"/>
+              </a:fillRef>
+              <a:effectRef idx="0">
+                <a:schemeClr val="accent1"/>
+              </a:effectRef>
+              <a:fontRef idx="minor">
+                <a:schemeClr val="lt1"/>
+              </a:fontRef>
+            </p:style>
+            <p:txBody>
+              <a:bodyPr rtlCol="0" anchor="ctr"/>
+              <a:lstStyle/>
+              <a:p>
+                <a:pPr algn="ctr"/>
+                <a:endParaRPr kumimoji="1" lang="zh-CN" altLang="en-US">
+                  <a:solidFill>
+                    <a:schemeClr val="tx1"/>
+                  </a:solidFill>
+                </a:endParaRPr>
+              </a:p>
+            </p:txBody>
+          </p:sp>
+          <p:sp>
+            <p:nvSpPr>
+              <p:cNvPr id="22" name="手杖形箭头 21"/>
+              <p:cNvSpPr/>
+              <p:nvPr/>
+            </p:nvSpPr>
+            <p:spPr>
+              <a:xfrm>
+                <a:off x="8795935" y="2260360"/>
+                <a:ext cx="1162842" cy="806276"/>
+              </a:xfrm>
+              <a:prstGeom prst="uturnArrow">
+                <a:avLst>
+                  <a:gd name="adj1" fmla="val 5089"/>
+                  <a:gd name="adj2" fmla="val 8628"/>
+                  <a:gd name="adj3" fmla="val 14444"/>
+                  <a:gd name="adj4" fmla="val 66707"/>
+                  <a:gd name="adj5" fmla="val 99138"/>
+                </a:avLst>
+              </a:prstGeom>
+              <a:ln>
+                <a:noFill/>
+              </a:ln>
+            </p:spPr>
+            <p:style>
+              <a:lnRef idx="2">
+                <a:schemeClr val="accent1">
+                  <a:shade val="50000"/>
+                </a:schemeClr>
+              </a:lnRef>
+              <a:fillRef idx="1">
+                <a:schemeClr val="accent1"/>
+              </a:fillRef>
+              <a:effectRef idx="0">
+                <a:schemeClr val="accent1"/>
+              </a:effectRef>
+              <a:fontRef idx="minor">
+                <a:schemeClr val="lt1"/>
+              </a:fontRef>
+            </p:style>
+            <p:txBody>
+              <a:bodyPr rtlCol="0" anchor="ctr"/>
+              <a:lstStyle/>
+              <a:p>
+                <a:pPr algn="ctr"/>
+                <a:endParaRPr kumimoji="1" lang="zh-CN" altLang="en-US">
+                  <a:solidFill>
+                    <a:schemeClr val="tx1"/>
+                  </a:solidFill>
+                </a:endParaRPr>
+              </a:p>
+            </p:txBody>
+          </p:sp>
+        </p:grpSp>
+      </p:grpSp>
+    </p:spTree>
+    <p:extLst>
+      <p:ext uri="{BB962C8B-B14F-4D97-AF65-F5344CB8AC3E}">
+        <p14:creationId xmlns:p14="http://schemas.microsoft.com/office/powerpoint/2010/main" val="1579068977"/>
+      </p:ext>
+    </p:extLst>
+  </p:cSld>
+  <p:clrMapOvr>
+    <a:masterClrMapping/>
+  </p:clrMapOvr>
+</p:sld>
+</file>
+
+<file path=ppt/slides/slide13.xml><?xml version="1.0" encoding="utf-8"?>
+<p:sld xmlns:a="http://schemas.openxmlformats.org/drawingml/2006/main" xmlns:r="http://schemas.openxmlformats.org/officeDocument/2006/relationships" xmlns:p="http://schemas.openxmlformats.org/presentationml/2006/main">
+  <p:cSld>
+    <p:spTree>
+      <p:nvGrpSpPr>
+        <p:cNvPr id="1" name=""/>
+        <p:cNvGrpSpPr/>
+        <p:nvPr/>
+      </p:nvGrpSpPr>
+      <p:grpSpPr>
+        <a:xfrm>
+          <a:off x="0" y="0"/>
+          <a:ext cx="0" cy="0"/>
+          <a:chOff x="0" y="0"/>
+          <a:chExt cx="0" cy="0"/>
+        </a:xfrm>
+      </p:grpSpPr>
+      <p:sp>
+        <p:nvSpPr>
+          <p:cNvPr id="2" name="标题 1"/>
+          <p:cNvSpPr>
+            <a:spLocks noGrp="1"/>
+          </p:cNvSpPr>
+          <p:nvPr>
+            <p:ph type="title"/>
+          </p:nvPr>
+        </p:nvSpPr>
+        <p:spPr/>
+        <p:txBody>
+          <a:bodyPr/>
+          <a:lstStyle/>
+          <a:p>
+            <a:endParaRPr kumimoji="1" lang="zh-CN" altLang="en-US"/>
+          </a:p>
+        </p:txBody>
+      </p:sp>
+      <p:sp>
+        <p:nvSpPr>
+          <p:cNvPr id="3" name="内容占位符 2"/>
+          <p:cNvSpPr>
+            <a:spLocks noGrp="1"/>
+          </p:cNvSpPr>
+          <p:nvPr>
+            <p:ph idx="1"/>
+          </p:nvPr>
+        </p:nvSpPr>
+        <p:spPr/>
+        <p:txBody>
+          <a:bodyPr/>
+          <a:lstStyle/>
+          <a:p>
+            <a:endParaRPr kumimoji="1" lang="zh-CN" altLang="en-US"/>
+          </a:p>
+        </p:txBody>
+      </p:sp>
+    </p:spTree>
+    <p:extLst>
+      <p:ext uri="{BB962C8B-B14F-4D97-AF65-F5344CB8AC3E}">
+        <p14:creationId xmlns:p14="http://schemas.microsoft.com/office/powerpoint/2010/main" val="1353436873"/>
+      </p:ext>
+    </p:extLst>
+  </p:cSld>
+  <p:clrMapOvr>
+    <a:masterClrMapping/>
+  </p:clrMapOvr>
+</p:sld>
+</file>
+
+<file path=ppt/slides/slide14.xml><?xml version="1.0" encoding="utf-8"?>
+<p:sld xmlns:a="http://schemas.openxmlformats.org/drawingml/2006/main" xmlns:r="http://schemas.openxmlformats.org/officeDocument/2006/relationships" xmlns:p="http://schemas.openxmlformats.org/presentationml/2006/main">
+  <p:cSld>
+    <p:spTree>
+      <p:nvGrpSpPr>
+        <p:cNvPr id="1" name=""/>
+        <p:cNvGrpSpPr/>
+        <p:nvPr/>
+      </p:nvGrpSpPr>
+      <p:grpSpPr>
+        <a:xfrm>
+          <a:off x="0" y="0"/>
+          <a:ext cx="0" cy="0"/>
+          <a:chOff x="0" y="0"/>
+          <a:chExt cx="0" cy="0"/>
+        </a:xfrm>
+      </p:grpSpPr>
+      <p:sp>
+        <p:nvSpPr>
+          <p:cNvPr id="2" name="标题 1"/>
+          <p:cNvSpPr>
+            <a:spLocks noGrp="1"/>
+          </p:cNvSpPr>
+          <p:nvPr>
+            <p:ph type="title"/>
+          </p:nvPr>
+        </p:nvSpPr>
+        <p:spPr/>
+        <p:txBody>
+          <a:bodyPr/>
+          <a:lstStyle/>
+          <a:p>
+            <a:endParaRPr kumimoji="1" lang="zh-CN" altLang="en-US"/>
+          </a:p>
+        </p:txBody>
+      </p:sp>
+      <p:sp>
+        <p:nvSpPr>
+          <p:cNvPr id="3" name="内容占位符 2"/>
+          <p:cNvSpPr>
+            <a:spLocks noGrp="1"/>
+          </p:cNvSpPr>
+          <p:nvPr>
+            <p:ph idx="1"/>
+          </p:nvPr>
+        </p:nvSpPr>
+        <p:spPr/>
+        <p:txBody>
+          <a:bodyPr/>
+          <a:lstStyle/>
+          <a:p>
+            <a:endParaRPr kumimoji="1" lang="zh-CN" altLang="en-US"/>
+          </a:p>
+        </p:txBody>
+      </p:sp>
+    </p:spTree>
+    <p:extLst>
+      <p:ext uri="{BB962C8B-B14F-4D97-AF65-F5344CB8AC3E}">
+        <p14:creationId xmlns:p14="http://schemas.microsoft.com/office/powerpoint/2010/main" val="1983228458"/>
+      </p:ext>
+    </p:extLst>
+  </p:cSld>
+  <p:clrMapOvr>
+    <a:masterClrMapping/>
+  </p:clrMapOvr>
+</p:sld>
+</file>
+
+<file path=ppt/slides/slide15.xml><?xml version="1.0" encoding="utf-8"?>
+<p:sld xmlns:a="http://schemas.openxmlformats.org/drawingml/2006/main" xmlns:r="http://schemas.openxmlformats.org/officeDocument/2006/relationships" xmlns:p="http://schemas.openxmlformats.org/presentationml/2006/main">
+  <p:cSld>
+    <p:spTree>
+      <p:nvGrpSpPr>
+        <p:cNvPr id="1" name=""/>
+        <p:cNvGrpSpPr/>
+        <p:nvPr/>
+      </p:nvGrpSpPr>
+      <p:grpSpPr>
+        <a:xfrm>
+          <a:off x="0" y="0"/>
+          <a:ext cx="0" cy="0"/>
+          <a:chOff x="0" y="0"/>
+          <a:chExt cx="0" cy="0"/>
+        </a:xfrm>
+      </p:grpSpPr>
+      <p:sp>
+        <p:nvSpPr>
+          <p:cNvPr id="2" name="标题 1"/>
+          <p:cNvSpPr>
+            <a:spLocks noGrp="1"/>
+          </p:cNvSpPr>
+          <p:nvPr>
+            <p:ph type="title"/>
+          </p:nvPr>
+        </p:nvSpPr>
+        <p:spPr/>
+        <p:txBody>
+          <a:bodyPr/>
+          <a:lstStyle/>
+          <a:p>
+            <a:endParaRPr kumimoji="1" lang="zh-CN" altLang="en-US"/>
+          </a:p>
+        </p:txBody>
+      </p:sp>
+      <p:sp>
+        <p:nvSpPr>
+          <p:cNvPr id="3" name="内容占位符 2"/>
+          <p:cNvSpPr>
+            <a:spLocks noGrp="1"/>
+          </p:cNvSpPr>
+          <p:nvPr>
+            <p:ph idx="1"/>
+          </p:nvPr>
+        </p:nvSpPr>
+        <p:spPr/>
+        <p:txBody>
+          <a:bodyPr/>
+          <a:lstStyle/>
+          <a:p>
+            <a:endParaRPr kumimoji="1" lang="zh-CN" altLang="en-US"/>
+          </a:p>
+        </p:txBody>
+      </p:sp>
+    </p:spTree>
+    <p:extLst>
+      <p:ext uri="{BB962C8B-B14F-4D97-AF65-F5344CB8AC3E}">
+        <p14:creationId xmlns:p14="http://schemas.microsoft.com/office/powerpoint/2010/main" val="941804289"/>
       </p:ext>
     </p:extLst>
   </p:cSld>
@@ -18253,11 +20326,7 @@
                 </a:r>
                 <a:r>
                   <a:rPr kumimoji="1" lang="en-US" altLang="zh-CN" sz="2400" dirty="0" smtClean="0"/>
-                  <a:t>Block</a:t>
-                </a:r>
-                <a:r>
-                  <a:rPr kumimoji="1" lang="en-US" altLang="zh-CN" sz="2400" dirty="0" smtClean="0"/>
-                  <a:t>s</a:t>
+                  <a:t>Blocks</a:t>
                 </a:r>
                 <a:endParaRPr kumimoji="1" lang="zh-CN" altLang="en-US" sz="2400" dirty="0"/>
               </a:p>

</xml_diff>